<commit_message>
Se actualizo la imagen del Diagrama de Bloques.
</commit_message>
<xml_diff>
--- a/Documentos/Presentacion - Proyecto Final - PdM.pptx
+++ b/Documentos/Presentacion - Proyecto Final - PdM.pptx
@@ -340,7 +340,7 @@
             <a:fld id="{1D8BD707-D9CF-40AE-B4C6-C98DA3205C09}" type="datetimeFigureOut">
               <a:rPr lang="en-US" smtClean="0"/>
               <a:pPr/>
-              <a:t>10/16/2025</a:t>
+              <a:t>10/18/2025</a:t>
             </a:fld>
             <a:endParaRPr lang="en-US"/>
           </a:p>
@@ -505,7 +505,7 @@
             <a:fld id="{1D8BD707-D9CF-40AE-B4C6-C98DA3205C09}" type="datetimeFigureOut">
               <a:rPr lang="en-US" smtClean="0"/>
               <a:pPr/>
-              <a:t>10/16/2025</a:t>
+              <a:t>10/18/2025</a:t>
             </a:fld>
             <a:endParaRPr lang="en-US"/>
           </a:p>
@@ -680,7 +680,7 @@
             <a:fld id="{1D8BD707-D9CF-40AE-B4C6-C98DA3205C09}" type="datetimeFigureOut">
               <a:rPr lang="en-US" smtClean="0"/>
               <a:pPr/>
-              <a:t>10/16/2025</a:t>
+              <a:t>10/18/2025</a:t>
             </a:fld>
             <a:endParaRPr lang="en-US"/>
           </a:p>
@@ -845,7 +845,7 @@
             <a:fld id="{1D8BD707-D9CF-40AE-B4C6-C98DA3205C09}" type="datetimeFigureOut">
               <a:rPr lang="en-US" smtClean="0"/>
               <a:pPr/>
-              <a:t>10/16/2025</a:t>
+              <a:t>10/18/2025</a:t>
             </a:fld>
             <a:endParaRPr lang="en-US"/>
           </a:p>
@@ -1087,7 +1087,7 @@
             <a:fld id="{1D8BD707-D9CF-40AE-B4C6-C98DA3205C09}" type="datetimeFigureOut">
               <a:rPr lang="en-US" smtClean="0"/>
               <a:pPr/>
-              <a:t>10/16/2025</a:t>
+              <a:t>10/18/2025</a:t>
             </a:fld>
             <a:endParaRPr lang="en-US"/>
           </a:p>
@@ -1369,7 +1369,7 @@
             <a:fld id="{1D8BD707-D9CF-40AE-B4C6-C98DA3205C09}" type="datetimeFigureOut">
               <a:rPr lang="en-US" smtClean="0"/>
               <a:pPr/>
-              <a:t>10/16/2025</a:t>
+              <a:t>10/18/2025</a:t>
             </a:fld>
             <a:endParaRPr lang="en-US"/>
           </a:p>
@@ -1785,7 +1785,7 @@
             <a:fld id="{1D8BD707-D9CF-40AE-B4C6-C98DA3205C09}" type="datetimeFigureOut">
               <a:rPr lang="en-US" smtClean="0"/>
               <a:pPr/>
-              <a:t>10/16/2025</a:t>
+              <a:t>10/18/2025</a:t>
             </a:fld>
             <a:endParaRPr lang="en-US"/>
           </a:p>
@@ -1899,7 +1899,7 @@
             <a:fld id="{1D8BD707-D9CF-40AE-B4C6-C98DA3205C09}" type="datetimeFigureOut">
               <a:rPr lang="en-US" smtClean="0"/>
               <a:pPr/>
-              <a:t>10/16/2025</a:t>
+              <a:t>10/18/2025</a:t>
             </a:fld>
             <a:endParaRPr lang="en-US"/>
           </a:p>
@@ -1991,7 +1991,7 @@
             <a:fld id="{1D8BD707-D9CF-40AE-B4C6-C98DA3205C09}" type="datetimeFigureOut">
               <a:rPr lang="en-US" smtClean="0"/>
               <a:pPr/>
-              <a:t>10/16/2025</a:t>
+              <a:t>10/18/2025</a:t>
             </a:fld>
             <a:endParaRPr lang="en-US"/>
           </a:p>
@@ -2263,7 +2263,7 @@
             <a:fld id="{1D8BD707-D9CF-40AE-B4C6-C98DA3205C09}" type="datetimeFigureOut">
               <a:rPr lang="en-US" smtClean="0"/>
               <a:pPr/>
-              <a:t>10/16/2025</a:t>
+              <a:t>10/18/2025</a:t>
             </a:fld>
             <a:endParaRPr lang="en-US"/>
           </a:p>
@@ -2512,7 +2512,7 @@
             <a:fld id="{1D8BD707-D9CF-40AE-B4C6-C98DA3205C09}" type="datetimeFigureOut">
               <a:rPr lang="en-US" smtClean="0"/>
               <a:pPr/>
-              <a:t>10/16/2025</a:t>
+              <a:t>10/18/2025</a:t>
             </a:fld>
             <a:endParaRPr lang="en-US"/>
           </a:p>
@@ -2720,7 +2720,7 @@
             <a:fld id="{1D8BD707-D9CF-40AE-B4C6-C98DA3205C09}" type="datetimeFigureOut">
               <a:rPr lang="en-US" smtClean="0"/>
               <a:pPr/>
-              <a:t>10/16/2025</a:t>
+              <a:t>10/18/2025</a:t>
             </a:fld>
             <a:endParaRPr lang="en-US"/>
           </a:p>
@@ -9178,52 +9178,6 @@
       </p:grpSp>
       <p:sp>
         <p:nvSpPr>
-          <p:cNvPr id="11" name="Freeform 11"/>
-          <p:cNvSpPr/>
-          <p:nvPr/>
-        </p:nvSpPr>
-        <p:spPr>
-          <a:xfrm>
-            <a:off x="1514071" y="3058128"/>
-            <a:ext cx="6650212" cy="4950330"/>
-          </a:xfrm>
-          <a:custGeom>
-            <a:avLst/>
-            <a:gdLst/>
-            <a:ahLst/>
-            <a:cxnLst/>
-            <a:rect l="l" t="t" r="r" b="b"/>
-            <a:pathLst>
-              <a:path w="6650212" h="4950330">
-                <a:moveTo>
-                  <a:pt x="0" y="0"/>
-                </a:moveTo>
-                <a:lnTo>
-                  <a:pt x="6650212" y="0"/>
-                </a:lnTo>
-                <a:lnTo>
-                  <a:pt x="6650212" y="4950331"/>
-                </a:lnTo>
-                <a:lnTo>
-                  <a:pt x="0" y="4950331"/>
-                </a:lnTo>
-                <a:lnTo>
-                  <a:pt x="0" y="0"/>
-                </a:lnTo>
-                <a:close/>
-              </a:path>
-            </a:pathLst>
-          </a:custGeom>
-          <a:blipFill>
-            <a:blip r:embed="rId8"/>
-            <a:stretch>
-              <a:fillRect/>
-            </a:stretch>
-          </a:blipFill>
-        </p:spPr>
-      </p:sp>
-      <p:sp>
-        <p:nvSpPr>
           <p:cNvPr id="12" name="TextBox 12"/>
           <p:cNvSpPr txBox="1"/>
           <p:nvPr/>
@@ -9513,13 +9467,43 @@
             </a:pathLst>
           </a:custGeom>
           <a:blipFill>
-            <a:blip r:embed="rId9"/>
+            <a:blip r:embed="rId8"/>
             <a:stretch>
               <a:fillRect/>
             </a:stretch>
           </a:blipFill>
         </p:spPr>
       </p:sp>
+      <p:pic>
+        <p:nvPicPr>
+          <p:cNvPr id="15" name="Imagen 14">
+            <a:extLst>
+              <a:ext uri="{FF2B5EF4-FFF2-40B4-BE49-F238E27FC236}">
+                <a16:creationId xmlns:a16="http://schemas.microsoft.com/office/drawing/2014/main" id="{199733A9-884D-4919-AA61-B707EC6228CE}"/>
+              </a:ext>
+            </a:extLst>
+          </p:cNvPr>
+          <p:cNvPicPr>
+            <a:picLocks noChangeAspect="1"/>
+          </p:cNvPicPr>
+          <p:nvPr/>
+        </p:nvPicPr>
+        <p:blipFill>
+          <a:blip r:embed="rId9"/>
+          <a:stretch>
+            <a:fillRect/>
+          </a:stretch>
+        </p:blipFill>
+        <p:spPr>
+          <a:xfrm>
+            <a:off x="1655992" y="2969891"/>
+            <a:ext cx="6366361" cy="4669995"/>
+          </a:xfrm>
+          <a:prstGeom prst="rect">
+            <a:avLst/>
+          </a:prstGeom>
+        </p:spPr>
+      </p:pic>
     </p:spTree>
   </p:cSld>
   <p:clrMapOvr>

</xml_diff>